<commit_message>
Update of Get-Secret to always return string secrets as SecureString unless -AsPlainText is used.
</commit_message>
<xml_diff>
--- a/Modules/Microsoft.PowerShell.SecretsManagement/Docs/PowerShell_SecretsManagement.pptx
+++ b/Modules/Microsoft.PowerShell.SecretsManagement/Docs/PowerShell_SecretsManagement.pptx
@@ -228,7 +228,7 @@
           <a:p>
             <a:fld id="{232590B1-D575-4CF8-9FA8-50A3C06504B5}" type="datetimeFigureOut">
               <a:rPr lang="en-US" smtClean="0"/>
-              <a:t>11/14/2019</a:t>
+              <a:t>11/19/2019</a:t>
             </a:fld>
             <a:endParaRPr lang="en-US"/>
           </a:p>
@@ -666,7 +666,7 @@
           <a:p>
             <a:fld id="{86A4B88E-A45C-447B-ACCC-065570ABEFF8}" type="datetimeFigureOut">
               <a:rPr lang="en-US" smtClean="0"/>
-              <a:t>11/14/2019</a:t>
+              <a:t>11/19/2019</a:t>
             </a:fld>
             <a:endParaRPr lang="en-US"/>
           </a:p>
@@ -830,7 +830,7 @@
           <a:p>
             <a:fld id="{86A4B88E-A45C-447B-ACCC-065570ABEFF8}" type="datetimeFigureOut">
               <a:rPr lang="en-US" smtClean="0"/>
-              <a:t>11/14/2019</a:t>
+              <a:t>11/19/2019</a:t>
             </a:fld>
             <a:endParaRPr lang="en-US"/>
           </a:p>
@@ -1004,7 +1004,7 @@
           <a:p>
             <a:fld id="{86A4B88E-A45C-447B-ACCC-065570ABEFF8}" type="datetimeFigureOut">
               <a:rPr lang="en-US" smtClean="0"/>
-              <a:t>11/14/2019</a:t>
+              <a:t>11/19/2019</a:t>
             </a:fld>
             <a:endParaRPr lang="en-US"/>
           </a:p>
@@ -1168,7 +1168,7 @@
           <a:p>
             <a:fld id="{86A4B88E-A45C-447B-ACCC-065570ABEFF8}" type="datetimeFigureOut">
               <a:rPr lang="en-US" smtClean="0"/>
-              <a:t>11/14/2019</a:t>
+              <a:t>11/19/2019</a:t>
             </a:fld>
             <a:endParaRPr lang="en-US"/>
           </a:p>
@@ -1409,7 +1409,7 @@
           <a:p>
             <a:fld id="{86A4B88E-A45C-447B-ACCC-065570ABEFF8}" type="datetimeFigureOut">
               <a:rPr lang="en-US" smtClean="0"/>
-              <a:t>11/14/2019</a:t>
+              <a:t>11/19/2019</a:t>
             </a:fld>
             <a:endParaRPr lang="en-US"/>
           </a:p>
@@ -1672,7 +1672,7 @@
           <a:p>
             <a:fld id="{86A4B88E-A45C-447B-ACCC-065570ABEFF8}" type="datetimeFigureOut">
               <a:rPr lang="en-US" smtClean="0"/>
-              <a:t>11/14/2019</a:t>
+              <a:t>11/19/2019</a:t>
             </a:fld>
             <a:endParaRPr lang="en-US"/>
           </a:p>
@@ -2049,7 +2049,7 @@
           <a:p>
             <a:fld id="{86A4B88E-A45C-447B-ACCC-065570ABEFF8}" type="datetimeFigureOut">
               <a:rPr lang="en-US" smtClean="0"/>
-              <a:t>11/14/2019</a:t>
+              <a:t>11/19/2019</a:t>
             </a:fld>
             <a:endParaRPr lang="en-US"/>
           </a:p>
@@ -2198,7 +2198,7 @@
           <a:p>
             <a:fld id="{86A4B88E-A45C-447B-ACCC-065570ABEFF8}" type="datetimeFigureOut">
               <a:rPr lang="en-US" smtClean="0"/>
-              <a:t>11/14/2019</a:t>
+              <a:t>11/19/2019</a:t>
             </a:fld>
             <a:endParaRPr lang="en-US"/>
           </a:p>
@@ -2288,7 +2288,7 @@
           <a:p>
             <a:fld id="{86A4B88E-A45C-447B-ACCC-065570ABEFF8}" type="datetimeFigureOut">
               <a:rPr lang="en-US" smtClean="0"/>
-              <a:t>11/14/2019</a:t>
+              <a:t>11/19/2019</a:t>
             </a:fld>
             <a:endParaRPr lang="en-US"/>
           </a:p>
@@ -2548,7 +2548,7 @@
           <a:p>
             <a:fld id="{86A4B88E-A45C-447B-ACCC-065570ABEFF8}" type="datetimeFigureOut">
               <a:rPr lang="en-US" smtClean="0"/>
-              <a:t>11/14/2019</a:t>
+              <a:t>11/19/2019</a:t>
             </a:fld>
             <a:endParaRPr lang="en-US"/>
           </a:p>
@@ -2835,7 +2835,7 @@
           <a:p>
             <a:fld id="{86A4B88E-A45C-447B-ACCC-065570ABEFF8}" type="datetimeFigureOut">
               <a:rPr lang="en-US" smtClean="0"/>
-              <a:t>11/14/2019</a:t>
+              <a:t>11/19/2019</a:t>
             </a:fld>
             <a:endParaRPr lang="en-US"/>
           </a:p>
@@ -3604,7 +3604,7 @@
           <a:p>
             <a:fld id="{86A4B88E-A45C-447B-ACCC-065570ABEFF8}" type="datetimeFigureOut">
               <a:rPr lang="en-US" smtClean="0"/>
-              <a:t>11/14/2019</a:t>
+              <a:t>11/19/2019</a:t>
             </a:fld>
             <a:endParaRPr lang="en-US"/>
           </a:p>
@@ -4694,7 +4694,15 @@
             </a:pPr>
             <a:r>
               <a:rPr lang="en-US" sz="1400" dirty="0"/>
-              <a:t>Get-Secret [-Name] &lt;string&gt; [[-Vault] &lt;string&gt;] [&lt;</a:t>
+              <a:t>Get-Secret [-Name] &lt;string&gt; [[-Vault] &lt;string&gt;] [-</a:t>
+            </a:r>
+            <a:r>
+              <a:rPr lang="en-US" sz="1400" dirty="0" err="1"/>
+              <a:t>AsPlainText</a:t>
+            </a:r>
+            <a:r>
+              <a:rPr lang="en-US" sz="1400" dirty="0"/>
+              <a:t>] [&lt;</a:t>
             </a:r>
             <a:r>
               <a:rPr lang="en-US" sz="1400" dirty="0" err="1"/>
@@ -4881,23 +4889,19 @@
           <a:p>
             <a:r>
               <a:rPr lang="en-US" dirty="0"/>
-              <a:t>String secrets will be stored as </a:t>
+              <a:t>String secrets will be returned as </a:t>
             </a:r>
             <a:r>
               <a:rPr lang="en-US" dirty="0" err="1"/>
               <a:t>SecureString</a:t>
             </a:r>
             <a:r>
+              <a:rPr lang="en-US"/>
+              <a:t> objects </a:t>
+            </a:r>
+            <a:r>
               <a:rPr lang="en-US" dirty="0"/>
-              <a:t> types and returned as </a:t>
-            </a:r>
-            <a:r>
-              <a:rPr lang="en-US" dirty="0" err="1"/>
-              <a:t>SecureString</a:t>
-            </a:r>
-            <a:r>
-              <a:rPr lang="en-US" dirty="0"/>
-              <a:t> object unless user explicitly requests a (plain text) string be returned.</a:t>
+              <a:t>unless user explicitly requests a (plain text) string be returned.</a:t>
             </a:r>
           </a:p>
           <a:p>

</xml_diff>

<commit_message>
Changes to rename the script extension subdirectory name
</commit_message>
<xml_diff>
--- a/Modules/Microsoft.PowerShell.SecretsManagement/Docs/PowerShell_SecretsManagement.pptx
+++ b/Modules/Microsoft.PowerShell.SecretsManagement/Docs/PowerShell_SecretsManagement.pptx
@@ -228,7 +228,7 @@
           <a:p>
             <a:fld id="{232590B1-D575-4CF8-9FA8-50A3C06504B5}" type="datetimeFigureOut">
               <a:rPr lang="en-US" smtClean="0"/>
-              <a:t>11/19/2019</a:t>
+              <a:t>2/11/2020</a:t>
             </a:fld>
             <a:endParaRPr lang="en-US"/>
           </a:p>
@@ -666,7 +666,7 @@
           <a:p>
             <a:fld id="{86A4B88E-A45C-447B-ACCC-065570ABEFF8}" type="datetimeFigureOut">
               <a:rPr lang="en-US" smtClean="0"/>
-              <a:t>11/19/2019</a:t>
+              <a:t>2/11/2020</a:t>
             </a:fld>
             <a:endParaRPr lang="en-US"/>
           </a:p>
@@ -830,7 +830,7 @@
           <a:p>
             <a:fld id="{86A4B88E-A45C-447B-ACCC-065570ABEFF8}" type="datetimeFigureOut">
               <a:rPr lang="en-US" smtClean="0"/>
-              <a:t>11/19/2019</a:t>
+              <a:t>2/11/2020</a:t>
             </a:fld>
             <a:endParaRPr lang="en-US"/>
           </a:p>
@@ -1004,7 +1004,7 @@
           <a:p>
             <a:fld id="{86A4B88E-A45C-447B-ACCC-065570ABEFF8}" type="datetimeFigureOut">
               <a:rPr lang="en-US" smtClean="0"/>
-              <a:t>11/19/2019</a:t>
+              <a:t>2/11/2020</a:t>
             </a:fld>
             <a:endParaRPr lang="en-US"/>
           </a:p>
@@ -1168,7 +1168,7 @@
           <a:p>
             <a:fld id="{86A4B88E-A45C-447B-ACCC-065570ABEFF8}" type="datetimeFigureOut">
               <a:rPr lang="en-US" smtClean="0"/>
-              <a:t>11/19/2019</a:t>
+              <a:t>2/11/2020</a:t>
             </a:fld>
             <a:endParaRPr lang="en-US"/>
           </a:p>
@@ -1409,7 +1409,7 @@
           <a:p>
             <a:fld id="{86A4B88E-A45C-447B-ACCC-065570ABEFF8}" type="datetimeFigureOut">
               <a:rPr lang="en-US" smtClean="0"/>
-              <a:t>11/19/2019</a:t>
+              <a:t>2/11/2020</a:t>
             </a:fld>
             <a:endParaRPr lang="en-US"/>
           </a:p>
@@ -1672,7 +1672,7 @@
           <a:p>
             <a:fld id="{86A4B88E-A45C-447B-ACCC-065570ABEFF8}" type="datetimeFigureOut">
               <a:rPr lang="en-US" smtClean="0"/>
-              <a:t>11/19/2019</a:t>
+              <a:t>2/11/2020</a:t>
             </a:fld>
             <a:endParaRPr lang="en-US"/>
           </a:p>
@@ -2049,7 +2049,7 @@
           <a:p>
             <a:fld id="{86A4B88E-A45C-447B-ACCC-065570ABEFF8}" type="datetimeFigureOut">
               <a:rPr lang="en-US" smtClean="0"/>
-              <a:t>11/19/2019</a:t>
+              <a:t>2/11/2020</a:t>
             </a:fld>
             <a:endParaRPr lang="en-US"/>
           </a:p>
@@ -2198,7 +2198,7 @@
           <a:p>
             <a:fld id="{86A4B88E-A45C-447B-ACCC-065570ABEFF8}" type="datetimeFigureOut">
               <a:rPr lang="en-US" smtClean="0"/>
-              <a:t>11/19/2019</a:t>
+              <a:t>2/11/2020</a:t>
             </a:fld>
             <a:endParaRPr lang="en-US"/>
           </a:p>
@@ -2288,7 +2288,7 @@
           <a:p>
             <a:fld id="{86A4B88E-A45C-447B-ACCC-065570ABEFF8}" type="datetimeFigureOut">
               <a:rPr lang="en-US" smtClean="0"/>
-              <a:t>11/19/2019</a:t>
+              <a:t>2/11/2020</a:t>
             </a:fld>
             <a:endParaRPr lang="en-US"/>
           </a:p>
@@ -2548,7 +2548,7 @@
           <a:p>
             <a:fld id="{86A4B88E-A45C-447B-ACCC-065570ABEFF8}" type="datetimeFigureOut">
               <a:rPr lang="en-US" smtClean="0"/>
-              <a:t>11/19/2019</a:t>
+              <a:t>2/11/2020</a:t>
             </a:fld>
             <a:endParaRPr lang="en-US"/>
           </a:p>
@@ -2835,7 +2835,7 @@
           <a:p>
             <a:fld id="{86A4B88E-A45C-447B-ACCC-065570ABEFF8}" type="datetimeFigureOut">
               <a:rPr lang="en-US" smtClean="0"/>
-              <a:t>11/19/2019</a:t>
+              <a:t>2/11/2020</a:t>
             </a:fld>
             <a:endParaRPr lang="en-US"/>
           </a:p>
@@ -3604,7 +3604,7 @@
           <a:p>
             <a:fld id="{86A4B88E-A45C-447B-ACCC-065570ABEFF8}" type="datetimeFigureOut">
               <a:rPr lang="en-US" smtClean="0"/>
-              <a:t>11/19/2019</a:t>
+              <a:t>2/11/2020</a:t>
             </a:fld>
             <a:endParaRPr lang="en-US"/>
           </a:p>
@@ -7694,18 +7694,28 @@
             <p:ph idx="1"/>
           </p:nvPr>
         </p:nvSpPr>
-        <p:spPr/>
-        <p:txBody>
-          <a:bodyPr/>
+        <p:spPr>
+          <a:xfrm>
+            <a:off x="457200" y="1935480"/>
+            <a:ext cx="8382000" cy="4389120"/>
+          </a:xfrm>
+        </p:spPr>
+        <p:txBody>
+          <a:bodyPr>
+            <a:normAutofit/>
+          </a:bodyPr>
           <a:lstStyle/>
           <a:p>
             <a:r>
               <a:rPr lang="en-US" dirty="0"/>
               <a:t>PowerShell script module with </a:t>
             </a:r>
+            <a:br>
+              <a:rPr lang="en-US" dirty="0"/>
+            </a:br>
             <a:r>
               <a:rPr lang="en-US" dirty="0" err="1"/>
-              <a:t>ImplementingModule</a:t>
+              <a:t>SecretsManagementExtension</a:t>
             </a:r>
             <a:r>
               <a:rPr lang="en-US" dirty="0"/>
@@ -7789,7 +7799,7 @@
                 <a:latin typeface="Courier New" panose="02070309020205020404" pitchFamily="49" charset="0"/>
                 <a:cs typeface="Courier New" panose="02070309020205020404" pitchFamily="49" charset="0"/>
               </a:rPr>
-              <a:t>\AzKeyVaultScript.psd1</a:t>
+              <a:t>\AzKeyVault.psd1</a:t>
             </a:r>
           </a:p>
           <a:p>
@@ -7836,7 +7846,7 @@
                 <a:latin typeface="Courier New" panose="02070309020205020404" pitchFamily="49" charset="0"/>
                 <a:cs typeface="Courier New" panose="02070309020205020404" pitchFamily="49" charset="0"/>
               </a:rPr>
-              <a:t>ImplementingModule</a:t>
+              <a:t>SecretsManagementExtension</a:t>
             </a:r>
             <a:endParaRPr lang="en-US" sz="1200" dirty="0">
               <a:latin typeface="Courier New" panose="02070309020205020404" pitchFamily="49" charset="0"/>
@@ -7887,14 +7897,14 @@
                 <a:latin typeface="Courier New" panose="02070309020205020404" pitchFamily="49" charset="0"/>
                 <a:cs typeface="Courier New" panose="02070309020205020404" pitchFamily="49" charset="0"/>
               </a:rPr>
-              <a:t>ImplementingModule</a:t>
+              <a:t>SecretsManagementExtension</a:t>
             </a:r>
             <a:r>
               <a:rPr lang="en-US" sz="1200" dirty="0">
                 <a:latin typeface="Courier New" panose="02070309020205020404" pitchFamily="49" charset="0"/>
                 <a:cs typeface="Courier New" panose="02070309020205020404" pitchFamily="49" charset="0"/>
               </a:rPr>
-              <a:t>\ImplementingModule.psd1</a:t>
+              <a:t>\SecretsManagementExtension.psd1</a:t>
             </a:r>
           </a:p>
           <a:p>
@@ -7941,14 +7951,14 @@
                 <a:latin typeface="Courier New" panose="02070309020205020404" pitchFamily="49" charset="0"/>
                 <a:cs typeface="Courier New" panose="02070309020205020404" pitchFamily="49" charset="0"/>
               </a:rPr>
-              <a:t>ImplementingModule</a:t>
+              <a:t>SecretsManagementExtension</a:t>
             </a:r>
             <a:r>
               <a:rPr lang="en-US" sz="1200" dirty="0">
                 <a:latin typeface="Courier New" panose="02070309020205020404" pitchFamily="49" charset="0"/>
                 <a:cs typeface="Courier New" panose="02070309020205020404" pitchFamily="49" charset="0"/>
               </a:rPr>
-              <a:t>\ImplementingModule.psm1</a:t>
+              <a:t>\SecretsManagementExtension.psm1</a:t>
             </a:r>
           </a:p>
           <a:p>
@@ -8106,7 +8116,7 @@
                 </a:solidFill>
                 <a:latin typeface="SFMono-Regular"/>
               </a:rPr>
-              <a:t>'.\ImplementingModule.psm1'</a:t>
+              <a:t>‘.\SecretsManagementExtension.psm1'</a:t>
             </a:r>
             <a:endParaRPr lang="en-US" sz="1600" dirty="0">
               <a:solidFill>

</xml_diff>